<commit_message>
Finished dm_event.sim, updated guide
</commit_message>
<xml_diff>
--- a/talks/ZI Conference Talk V2.pptx
+++ b/talks/ZI Conference Talk V2.pptx
@@ -5,7 +5,7 @@
     <p:sldMasterId id="2147483648" r:id="rId1"/>
   </p:sldMasterIdLst>
   <p:notesMasterIdLst>
-    <p:notesMasterId r:id="rId33"/>
+    <p:notesMasterId r:id="rId35"/>
   </p:notesMasterIdLst>
   <p:sldIdLst>
     <p:sldId id="286" r:id="rId2"/>
@@ -34,11 +34,13 @@
     <p:sldId id="499" r:id="rId25"/>
     <p:sldId id="487" r:id="rId26"/>
     <p:sldId id="500" r:id="rId27"/>
-    <p:sldId id="497" r:id="rId28"/>
-    <p:sldId id="488" r:id="rId29"/>
-    <p:sldId id="357" r:id="rId30"/>
-    <p:sldId id="506" r:id="rId31"/>
-    <p:sldId id="508" r:id="rId32"/>
+    <p:sldId id="488" r:id="rId28"/>
+    <p:sldId id="509" r:id="rId29"/>
+    <p:sldId id="510" r:id="rId30"/>
+    <p:sldId id="511" r:id="rId31"/>
+    <p:sldId id="357" r:id="rId32"/>
+    <p:sldId id="506" r:id="rId33"/>
+    <p:sldId id="508" r:id="rId34"/>
   </p:sldIdLst>
   <p:sldSz cx="12192000" cy="6858000"/>
   <p:notesSz cx="6858000" cy="9144000"/>
@@ -227,7 +229,7 @@
           <a:p>
             <a:fld id="{44EF98E7-3C6E-427C-A0E4-7DAEF63E99C9}" type="datetimeFigureOut">
               <a:rPr lang="en-US" smtClean="0"/>
-              <a:t>10/23/2021</a:t>
+              <a:t>10/25/2021</a:t>
             </a:fld>
             <a:endParaRPr lang="en-US"/>
           </a:p>
@@ -1189,7 +1191,7 @@
           <a:p>
             <a:fld id="{AB3D36F5-83E9-41B9-BB61-7AB66EA280A1}" type="datetimeFigureOut">
               <a:rPr lang="en-US" smtClean="0"/>
-              <a:t>10/23/2021</a:t>
+              <a:t>10/25/2021</a:t>
             </a:fld>
             <a:endParaRPr lang="en-US"/>
           </a:p>
@@ -1387,7 +1389,7 @@
           <a:p>
             <a:fld id="{AB3D36F5-83E9-41B9-BB61-7AB66EA280A1}" type="datetimeFigureOut">
               <a:rPr lang="en-US" smtClean="0"/>
-              <a:t>10/23/2021</a:t>
+              <a:t>10/25/2021</a:t>
             </a:fld>
             <a:endParaRPr lang="en-US"/>
           </a:p>
@@ -1595,7 +1597,7 @@
           <a:p>
             <a:fld id="{AB3D36F5-83E9-41B9-BB61-7AB66EA280A1}" type="datetimeFigureOut">
               <a:rPr lang="en-US" smtClean="0"/>
-              <a:t>10/23/2021</a:t>
+              <a:t>10/25/2021</a:t>
             </a:fld>
             <a:endParaRPr lang="en-US"/>
           </a:p>
@@ -1793,7 +1795,7 @@
           <a:p>
             <a:fld id="{AB3D36F5-83E9-41B9-BB61-7AB66EA280A1}" type="datetimeFigureOut">
               <a:rPr lang="en-US" smtClean="0"/>
-              <a:t>10/23/2021</a:t>
+              <a:t>10/25/2021</a:t>
             </a:fld>
             <a:endParaRPr lang="en-US"/>
           </a:p>
@@ -2068,7 +2070,7 @@
           <a:p>
             <a:fld id="{AB3D36F5-83E9-41B9-BB61-7AB66EA280A1}" type="datetimeFigureOut">
               <a:rPr lang="en-US" smtClean="0"/>
-              <a:t>10/23/2021</a:t>
+              <a:t>10/25/2021</a:t>
             </a:fld>
             <a:endParaRPr lang="en-US"/>
           </a:p>
@@ -2333,7 +2335,7 @@
           <a:p>
             <a:fld id="{AB3D36F5-83E9-41B9-BB61-7AB66EA280A1}" type="datetimeFigureOut">
               <a:rPr lang="en-US" smtClean="0"/>
-              <a:t>10/23/2021</a:t>
+              <a:t>10/25/2021</a:t>
             </a:fld>
             <a:endParaRPr lang="en-US"/>
           </a:p>
@@ -2745,7 +2747,7 @@
           <a:p>
             <a:fld id="{AB3D36F5-83E9-41B9-BB61-7AB66EA280A1}" type="datetimeFigureOut">
               <a:rPr lang="en-US" smtClean="0"/>
-              <a:t>10/23/2021</a:t>
+              <a:t>10/25/2021</a:t>
             </a:fld>
             <a:endParaRPr lang="en-US"/>
           </a:p>
@@ -2886,7 +2888,7 @@
           <a:p>
             <a:fld id="{AB3D36F5-83E9-41B9-BB61-7AB66EA280A1}" type="datetimeFigureOut">
               <a:rPr lang="en-US" smtClean="0"/>
-              <a:t>10/23/2021</a:t>
+              <a:t>10/25/2021</a:t>
             </a:fld>
             <a:endParaRPr lang="en-US"/>
           </a:p>
@@ -2999,7 +3001,7 @@
           <a:p>
             <a:fld id="{AB3D36F5-83E9-41B9-BB61-7AB66EA280A1}" type="datetimeFigureOut">
               <a:rPr lang="en-US" smtClean="0"/>
-              <a:t>10/23/2021</a:t>
+              <a:t>10/25/2021</a:t>
             </a:fld>
             <a:endParaRPr lang="en-US"/>
           </a:p>
@@ -3310,7 +3312,7 @@
           <a:p>
             <a:fld id="{AB3D36F5-83E9-41B9-BB61-7AB66EA280A1}" type="datetimeFigureOut">
               <a:rPr lang="en-US" smtClean="0"/>
-              <a:t>10/23/2021</a:t>
+              <a:t>10/25/2021</a:t>
             </a:fld>
             <a:endParaRPr lang="en-US"/>
           </a:p>
@@ -3598,7 +3600,7 @@
           <a:p>
             <a:fld id="{AB3D36F5-83E9-41B9-BB61-7AB66EA280A1}" type="datetimeFigureOut">
               <a:rPr lang="en-US" smtClean="0"/>
-              <a:t>10/23/2021</a:t>
+              <a:t>10/25/2021</a:t>
             </a:fld>
             <a:endParaRPr lang="en-US"/>
           </a:p>
@@ -3839,7 +3841,7 @@
           <a:p>
             <a:fld id="{AB3D36F5-83E9-41B9-BB61-7AB66EA280A1}" type="datetimeFigureOut">
               <a:rPr lang="en-US" smtClean="0"/>
-              <a:t>10/23/2021</a:t>
+              <a:t>10/25/2021</a:t>
             </a:fld>
             <a:endParaRPr lang="en-US"/>
           </a:p>
@@ -20061,7 +20063,7 @@
         <p:spPr>
           <a:xfrm>
             <a:off x="1539443" y="833566"/>
-            <a:ext cx="9636805" cy="5632311"/>
+            <a:ext cx="9421938" cy="5632311"/>
           </a:xfrm>
           <a:prstGeom prst="rect">
             <a:avLst/>
@@ -20076,13 +20078,54 @@
           <a:p>
             <a:r>
               <a:rPr lang="en-US" sz="2400" dirty="0"/>
-              <a:t>ZID(TRADER):</a:t>
+              <a:t>ZIDP(ZID):</a:t>
             </a:r>
           </a:p>
           <a:p>
             <a:r>
               <a:rPr lang="en-US" sz="2400" dirty="0"/>
-              <a:t>    MOVE       -&gt;  (dx, </a:t>
+              <a:t>     BUY, SELL -&gt; uniform random budget constrained willingness to accept</a:t>
+            </a:r>
+          </a:p>
+          <a:p>
+            <a:r>
+              <a:rPr lang="en-US" sz="2400" dirty="0"/>
+              <a:t>  	          -&gt; picks best remaining offer</a:t>
+            </a:r>
+          </a:p>
+          <a:p>
+            <a:endParaRPr lang="en-US" sz="2400" dirty="0"/>
+          </a:p>
+          <a:p>
+            <a:r>
+              <a:rPr lang="en-US" sz="2400" dirty="0"/>
+              <a:t>ZIDPR(ZIDP):</a:t>
+            </a:r>
+          </a:p>
+          <a:p>
+            <a:r>
+              <a:rPr lang="en-US" sz="2400" dirty="0"/>
+              <a:t>       MOVE     </a:t>
+            </a:r>
+          </a:p>
+          <a:p>
+            <a:r>
+              <a:rPr lang="en-US" sz="2400" dirty="0"/>
+              <a:t>	          -&gt; if </a:t>
+            </a:r>
+            <a:r>
+              <a:rPr lang="en-US" sz="2400" dirty="0" err="1"/>
+              <a:t>num_agents</a:t>
+            </a:r>
+            <a:r>
+              <a:rPr lang="en-US" sz="2400" dirty="0"/>
+              <a:t> at point &gt; 2:</a:t>
+            </a:r>
+          </a:p>
+          <a:p>
+            <a:r>
+              <a:rPr lang="en-US" sz="2400" dirty="0"/>
+              <a:t>		         (dx, </a:t>
             </a:r>
             <a:r>
               <a:rPr lang="en-US" sz="2400" dirty="0" err="1"/>
@@ -20090,7 +20133,7 @@
             </a:r>
             <a:r>
               <a:rPr lang="en-US" sz="2400" dirty="0"/>
-              <a:t>) where dx ~ {-1, 0, +1}, and </a:t>
+              <a:t>) where dx ~ {-1,  +1} and </a:t>
             </a:r>
             <a:r>
               <a:rPr lang="en-US" sz="2400" dirty="0" err="1"/>
@@ -20098,72 +20141,25 @@
             </a:r>
             <a:r>
               <a:rPr lang="en-US" sz="2400" dirty="0"/>
-              <a:t> ~ {-1, 0, +1}</a:t>
+              <a:t> ~ {-1,  +1}</a:t>
             </a:r>
           </a:p>
           <a:p>
             <a:r>
               <a:rPr lang="en-US" sz="2400" dirty="0"/>
-              <a:t>    BID, ASK   -&gt; uniform random budget constrained offer</a:t>
+              <a:t>	          -&gt; else: </a:t>
             </a:r>
           </a:p>
           <a:p>
             <a:r>
               <a:rPr lang="en-US" sz="2400" dirty="0"/>
-              <a:t>    BUY, SELL -&gt; uniform random budget constrained willingness to accept</a:t>
+              <a:t>		         if contract last period:</a:t>
             </a:r>
           </a:p>
           <a:p>
             <a:r>
               <a:rPr lang="en-US" sz="2400" dirty="0"/>
-              <a:t>                      -&gt; uniform random choice of offer </a:t>
-            </a:r>
-          </a:p>
-          <a:p>
-            <a:r>
-              <a:rPr lang="en-US" sz="2400" dirty="0"/>
-              <a:t>ZIDP(ZID):</a:t>
-            </a:r>
-          </a:p>
-          <a:p>
-            <a:r>
-              <a:rPr lang="en-US" sz="2400" dirty="0"/>
-              <a:t>     BUY, SELL -&gt; uniform random budget constrained willingness to accept</a:t>
-            </a:r>
-          </a:p>
-          <a:p>
-            <a:r>
-              <a:rPr lang="en-US" sz="2400" dirty="0"/>
-              <a:t>  	          -&gt; picks best remaining offer</a:t>
-            </a:r>
-          </a:p>
-          <a:p>
-            <a:endParaRPr lang="en-US" sz="2400" dirty="0"/>
-          </a:p>
-          <a:p>
-            <a:r>
-              <a:rPr lang="en-US" sz="2400" dirty="0"/>
-              <a:t>ZIDPR(ZIDP)</a:t>
-            </a:r>
-          </a:p>
-          <a:p>
-            <a:r>
-              <a:rPr lang="en-US" sz="2400" dirty="0"/>
-              <a:t>       MOVE     -&gt; </a:t>
-            </a:r>
-            <a:r>
-              <a:rPr lang="en-US" sz="2400" dirty="0" err="1"/>
-              <a:t>num_agents</a:t>
-            </a:r>
-            <a:r>
-              <a:rPr lang="en-US" sz="2400" dirty="0"/>
-              <a:t> at point &gt; 2:</a:t>
-            </a:r>
-          </a:p>
-          <a:p>
-            <a:r>
-              <a:rPr lang="en-US" sz="2400" dirty="0"/>
-              <a:t>		 	(dx, </a:t>
+              <a:t>                                           (dx, </a:t>
             </a:r>
             <a:r>
               <a:rPr lang="en-US" sz="2400" dirty="0" err="1"/>
@@ -20171,21 +20167,19 @@
             </a:r>
             <a:r>
               <a:rPr lang="en-US" sz="2400" dirty="0"/>
-              <a:t>) where dx ~ {-1,  +1} and </a:t>
-            </a:r>
-            <a:r>
-              <a:rPr lang="en-US" sz="2400" dirty="0" err="1"/>
-              <a:t>dy</a:t>
-            </a:r>
+              <a:t>) = (0, 0):</a:t>
+            </a:r>
+          </a:p>
+          <a:p>
             <a:r>
               <a:rPr lang="en-US" sz="2400" dirty="0"/>
-              <a:t> ~ {-1,  +1}</a:t>
+              <a:t>		         else:  </a:t>
             </a:r>
           </a:p>
           <a:p>
             <a:r>
               <a:rPr lang="en-US" sz="2400" dirty="0"/>
-              <a:t>	          -&gt; otherwise, (dx, </a:t>
+              <a:t>			   (dx, </a:t>
             </a:r>
             <a:r>
               <a:rPr lang="en-US" sz="2400" dirty="0" err="1"/>
@@ -20489,8 +20483,8 @@
         </p:nvSpPr>
         <p:spPr>
           <a:xfrm>
-            <a:off x="1402080" y="4110882"/>
-            <a:ext cx="10132031" cy="1696269"/>
+            <a:off x="1345468" y="2245259"/>
+            <a:ext cx="9615913" cy="3594226"/>
           </a:xfrm>
           <a:prstGeom prst="rect">
             <a:avLst/>
@@ -20980,7 +20974,7 @@
         </p:nvSpPr>
         <p:spPr>
           <a:xfrm>
-            <a:off x="715196" y="2226983"/>
+            <a:off x="1065965" y="2226983"/>
             <a:ext cx="5076090" cy="4151376"/>
           </a:xfrm>
           <a:prstGeom prst="rect">
@@ -21009,7 +21003,7 @@
             </a:r>
             <a:r>
               <a:rPr lang="en-US" sz="2000" dirty="0"/>
-              <a:t> = 100</a:t>
+              <a:t> = 500</a:t>
             </a:r>
           </a:p>
           <a:p>
@@ -21188,8 +21182,8 @@
         </p:nvSpPr>
         <p:spPr>
           <a:xfrm>
-            <a:off x="558791" y="1101012"/>
-            <a:ext cx="4767074" cy="369332"/>
+            <a:off x="304592" y="1481258"/>
+            <a:ext cx="4840299" cy="369332"/>
           </a:xfrm>
           <a:prstGeom prst="rect">
             <a:avLst/>
@@ -21204,17 +21198,17 @@
           <a:p>
             <a:r>
               <a:rPr lang="en-US" dirty="0"/>
-              <a:t>Compare efficiency of ZID, ZIDP,  ZIDA, and ZIDPR</a:t>
+              <a:t>Compare Efficiency at 50%  ZIDPA, and 50% ZIDPR</a:t>
             </a:r>
           </a:p>
         </p:txBody>
       </p:sp>
       <p:pic>
         <p:nvPicPr>
-          <p:cNvPr id="5124" name="Picture 4">
+          <p:cNvPr id="7172" name="Picture 4">
             <a:extLst>
               <a:ext uri="{FF2B5EF4-FFF2-40B4-BE49-F238E27FC236}">
-                <a16:creationId xmlns:a16="http://schemas.microsoft.com/office/drawing/2014/main" id="{F3E9EFAD-15CA-4EC7-9500-0CA2A5C2F1C1}"/>
+                <a16:creationId xmlns:a16="http://schemas.microsoft.com/office/drawing/2014/main" id="{AD742BF3-C272-411F-BB43-28AD215A67F0}"/>
               </a:ext>
             </a:extLst>
           </p:cNvPr>
@@ -21238,8 +21232,8 @@
         </p:blipFill>
         <p:spPr bwMode="auto">
           <a:xfrm>
-            <a:off x="7008272" y="194679"/>
-            <a:ext cx="4803253" cy="3906542"/>
+            <a:off x="7047110" y="32456"/>
+            <a:ext cx="4993999" cy="4061677"/>
           </a:xfrm>
           <a:prstGeom prst="rect">
             <a:avLst/>
@@ -21259,7 +21253,7 @@
     </p:spTree>
     <p:extLst>
       <p:ext uri="{BB962C8B-B14F-4D97-AF65-F5344CB8AC3E}">
-        <p14:creationId xmlns:p14="http://schemas.microsoft.com/office/powerpoint/2010/main" val="1748389431"/>
+        <p14:creationId xmlns:p14="http://schemas.microsoft.com/office/powerpoint/2010/main" val="168574103"/>
       </p:ext>
     </p:extLst>
   </p:cSld>
@@ -21357,6 +21351,53 @@
           </a:p>
         </p:txBody>
       </p:sp>
+      <p:pic>
+        <p:nvPicPr>
+          <p:cNvPr id="1032" name="Picture 8">
+            <a:extLst>
+              <a:ext uri="{FF2B5EF4-FFF2-40B4-BE49-F238E27FC236}">
+                <a16:creationId xmlns:a16="http://schemas.microsoft.com/office/drawing/2014/main" id="{8E2E171D-637A-4946-9702-33A16D8AE740}"/>
+              </a:ext>
+            </a:extLst>
+          </p:cNvPr>
+          <p:cNvPicPr>
+            <a:picLocks noChangeAspect="1" noChangeArrowheads="1"/>
+          </p:cNvPicPr>
+          <p:nvPr/>
+        </p:nvPicPr>
+        <p:blipFill>
+          <a:blip r:embed="rId2">
+            <a:extLst>
+              <a:ext uri="{28A0092B-C50C-407E-A947-70E740481C1C}">
+                <a14:useLocalDpi xmlns:a14="http://schemas.microsoft.com/office/drawing/2010/main" val="0"/>
+              </a:ext>
+            </a:extLst>
+          </a:blip>
+          <a:srcRect/>
+          <a:stretch>
+            <a:fillRect/>
+          </a:stretch>
+        </p:blipFill>
+        <p:spPr bwMode="auto">
+          <a:xfrm>
+            <a:off x="7046871" y="0"/>
+            <a:ext cx="5154005" cy="4151377"/>
+          </a:xfrm>
+          <a:prstGeom prst="rect">
+            <a:avLst/>
+          </a:prstGeom>
+          <a:noFill/>
+          <a:extLst>
+            <a:ext uri="{909E8E84-426E-40DD-AFC4-6F175D3DCCD1}">
+              <a14:hiddenFill xmlns:a14="http://schemas.microsoft.com/office/drawing/2010/main">
+                <a:solidFill>
+                  <a:srgbClr val="FFFFFF"/>
+                </a:solidFill>
+              </a14:hiddenFill>
+            </a:ext>
+          </a:extLst>
+        </p:spPr>
+      </p:pic>
       <p:sp>
         <p:nvSpPr>
           <p:cNvPr id="73" name="Freeform: Shape 72">
@@ -21743,7 +21784,7 @@
             </a:r>
             <a:r>
               <a:rPr lang="en-US" sz="2000" dirty="0"/>
-              <a:t> = 500</a:t>
+              <a:t> = 100</a:t>
             </a:r>
           </a:p>
           <a:p>
@@ -21923,7 +21964,7 @@
         <p:spPr>
           <a:xfrm>
             <a:off x="304592" y="1481258"/>
-            <a:ext cx="4840299" cy="369332"/>
+            <a:ext cx="4214295" cy="369332"/>
           </a:xfrm>
           <a:prstGeom prst="rect">
             <a:avLst/>
@@ -21938,62 +21979,249 @@
           <a:p>
             <a:r>
               <a:rPr lang="en-US" dirty="0"/>
-              <a:t>Compare Efficiency at 50%  ZIDPA, and 50% ZIDPR</a:t>
+              <a:t>Compare Efficiency at %ZIDA, and %ZIDPR</a:t>
             </a:r>
           </a:p>
         </p:txBody>
       </p:sp>
-      <p:pic>
-        <p:nvPicPr>
-          <p:cNvPr id="7172" name="Picture 4">
+      <p:sp>
+        <p:nvSpPr>
+          <p:cNvPr id="2" name="TextBox 1">
             <a:extLst>
               <a:ext uri="{FF2B5EF4-FFF2-40B4-BE49-F238E27FC236}">
-                <a16:creationId xmlns:a16="http://schemas.microsoft.com/office/drawing/2014/main" id="{AD742BF3-C272-411F-BB43-28AD215A67F0}"/>
+                <a16:creationId xmlns:a16="http://schemas.microsoft.com/office/drawing/2014/main" id="{EFBAC287-53A6-401E-88A4-C427613900A6}"/>
               </a:ext>
             </a:extLst>
           </p:cNvPr>
-          <p:cNvPicPr>
-            <a:picLocks noChangeAspect="1" noChangeArrowheads="1"/>
-          </p:cNvPicPr>
+          <p:cNvSpPr txBox="1"/>
           <p:nvPr/>
-        </p:nvPicPr>
-        <p:blipFill>
-          <a:blip r:embed="rId2">
-            <a:extLst>
-              <a:ext uri="{28A0092B-C50C-407E-A947-70E740481C1C}">
-                <a14:useLocalDpi xmlns:a14="http://schemas.microsoft.com/office/drawing/2010/main" val="0"/>
-              </a:ext>
-            </a:extLst>
-          </a:blip>
-          <a:srcRect/>
-          <a:stretch>
-            <a:fillRect/>
-          </a:stretch>
-        </p:blipFill>
-        <p:spPr bwMode="auto">
+        </p:nvSpPr>
+        <p:spPr>
           <a:xfrm>
-            <a:off x="7047110" y="32456"/>
-            <a:ext cx="4993999" cy="4061677"/>
+            <a:off x="10805030" y="332745"/>
+            <a:ext cx="1261307" cy="369332"/>
           </a:xfrm>
           <a:prstGeom prst="rect">
             <a:avLst/>
           </a:prstGeom>
           <a:noFill/>
-          <a:extLst>
-            <a:ext uri="{909E8E84-426E-40DD-AFC4-6F175D3DCCD1}">
-              <a14:hiddenFill xmlns:a14="http://schemas.microsoft.com/office/drawing/2010/main">
-                <a:solidFill>
-                  <a:srgbClr val="FFFFFF"/>
-                </a:solidFill>
-              </a14:hiddenFill>
-            </a:ext>
-          </a:extLst>
         </p:spPr>
-      </p:pic>
+        <p:txBody>
+          <a:bodyPr wrap="none" rtlCol="0">
+            <a:spAutoFit/>
+          </a:bodyPr>
+          <a:lstStyle/>
+          <a:p>
+            <a:r>
+              <a:rPr lang="en-US" b="1" dirty="0">
+                <a:solidFill>
+                  <a:schemeClr val="bg1"/>
+                </a:solidFill>
+              </a:rPr>
+              <a:t>ZIDA 100% </a:t>
+            </a:r>
+          </a:p>
+        </p:txBody>
+      </p:sp>
+      <p:sp>
+        <p:nvSpPr>
+          <p:cNvPr id="11" name="TextBox 10">
+            <a:extLst>
+              <a:ext uri="{FF2B5EF4-FFF2-40B4-BE49-F238E27FC236}">
+                <a16:creationId xmlns:a16="http://schemas.microsoft.com/office/drawing/2014/main" id="{922D53AF-BC69-4BF1-9FB6-1FED3088BF2E}"/>
+              </a:ext>
+            </a:extLst>
+          </p:cNvPr>
+          <p:cNvSpPr txBox="1"/>
+          <p:nvPr/>
+        </p:nvSpPr>
+        <p:spPr>
+          <a:xfrm>
+            <a:off x="8882527" y="865829"/>
+            <a:ext cx="1144288" cy="369332"/>
+          </a:xfrm>
+          <a:prstGeom prst="rect">
+            <a:avLst/>
+          </a:prstGeom>
+          <a:noFill/>
+        </p:spPr>
+        <p:txBody>
+          <a:bodyPr wrap="none" rtlCol="0">
+            <a:spAutoFit/>
+          </a:bodyPr>
+          <a:lstStyle/>
+          <a:p>
+            <a:r>
+              <a:rPr lang="en-US" b="1" dirty="0">
+                <a:solidFill>
+                  <a:schemeClr val="bg1"/>
+                </a:solidFill>
+              </a:rPr>
+              <a:t>ZIDA 90% </a:t>
+            </a:r>
+          </a:p>
+        </p:txBody>
+      </p:sp>
+      <p:sp>
+        <p:nvSpPr>
+          <p:cNvPr id="12" name="TextBox 11">
+            <a:extLst>
+              <a:ext uri="{FF2B5EF4-FFF2-40B4-BE49-F238E27FC236}">
+                <a16:creationId xmlns:a16="http://schemas.microsoft.com/office/drawing/2014/main" id="{48AF5CFB-C38D-418D-906E-2BA7A47D8FC2}"/>
+              </a:ext>
+            </a:extLst>
+          </p:cNvPr>
+          <p:cNvSpPr txBox="1"/>
+          <p:nvPr/>
+        </p:nvSpPr>
+        <p:spPr>
+          <a:xfrm>
+            <a:off x="9711458" y="1329292"/>
+            <a:ext cx="1144288" cy="369332"/>
+          </a:xfrm>
+          <a:prstGeom prst="rect">
+            <a:avLst/>
+          </a:prstGeom>
+          <a:noFill/>
+        </p:spPr>
+        <p:txBody>
+          <a:bodyPr wrap="none" rtlCol="0">
+            <a:spAutoFit/>
+          </a:bodyPr>
+          <a:lstStyle/>
+          <a:p>
+            <a:r>
+              <a:rPr lang="en-US" b="1" dirty="0">
+                <a:solidFill>
+                  <a:schemeClr val="bg1"/>
+                </a:solidFill>
+              </a:rPr>
+              <a:t>ZIDA 70% </a:t>
+            </a:r>
+          </a:p>
+        </p:txBody>
+      </p:sp>
+      <p:sp>
+        <p:nvSpPr>
+          <p:cNvPr id="13" name="TextBox 12">
+            <a:extLst>
+              <a:ext uri="{FF2B5EF4-FFF2-40B4-BE49-F238E27FC236}">
+                <a16:creationId xmlns:a16="http://schemas.microsoft.com/office/drawing/2014/main" id="{8CBEFE52-D0C6-4DCF-9267-C80B2CEF46F7}"/>
+              </a:ext>
+            </a:extLst>
+          </p:cNvPr>
+          <p:cNvSpPr txBox="1"/>
+          <p:nvPr/>
+        </p:nvSpPr>
+        <p:spPr>
+          <a:xfrm>
+            <a:off x="10525398" y="1562824"/>
+            <a:ext cx="1144288" cy="369332"/>
+          </a:xfrm>
+          <a:prstGeom prst="rect">
+            <a:avLst/>
+          </a:prstGeom>
+          <a:noFill/>
+        </p:spPr>
+        <p:txBody>
+          <a:bodyPr wrap="none" rtlCol="0">
+            <a:spAutoFit/>
+          </a:bodyPr>
+          <a:lstStyle/>
+          <a:p>
+            <a:r>
+              <a:rPr lang="en-US" b="1" dirty="0">
+                <a:solidFill>
+                  <a:schemeClr val="bg1"/>
+                </a:solidFill>
+              </a:rPr>
+              <a:t>ZIDA 50% </a:t>
+            </a:r>
+          </a:p>
+        </p:txBody>
+      </p:sp>
+      <p:sp>
+        <p:nvSpPr>
+          <p:cNvPr id="14" name="TextBox 13">
+            <a:extLst>
+              <a:ext uri="{FF2B5EF4-FFF2-40B4-BE49-F238E27FC236}">
+                <a16:creationId xmlns:a16="http://schemas.microsoft.com/office/drawing/2014/main" id="{A602843E-D2B0-4B0E-9057-3961DC7A3E66}"/>
+              </a:ext>
+            </a:extLst>
+          </p:cNvPr>
+          <p:cNvSpPr txBox="1"/>
+          <p:nvPr/>
+        </p:nvSpPr>
+        <p:spPr>
+          <a:xfrm>
+            <a:off x="11097542" y="1981022"/>
+            <a:ext cx="1027269" cy="369332"/>
+          </a:xfrm>
+          <a:prstGeom prst="rect">
+            <a:avLst/>
+          </a:prstGeom>
+          <a:noFill/>
+        </p:spPr>
+        <p:txBody>
+          <a:bodyPr wrap="none" rtlCol="0">
+            <a:spAutoFit/>
+          </a:bodyPr>
+          <a:lstStyle/>
+          <a:p>
+            <a:r>
+              <a:rPr lang="en-US" b="1" dirty="0">
+                <a:solidFill>
+                  <a:schemeClr val="bg1"/>
+                </a:solidFill>
+              </a:rPr>
+              <a:t>ZIDA 0% </a:t>
+            </a:r>
+          </a:p>
+        </p:txBody>
+      </p:sp>
+      <p:sp>
+        <p:nvSpPr>
+          <p:cNvPr id="18" name="TextBox 17">
+            <a:extLst>
+              <a:ext uri="{FF2B5EF4-FFF2-40B4-BE49-F238E27FC236}">
+                <a16:creationId xmlns:a16="http://schemas.microsoft.com/office/drawing/2014/main" id="{70608EC6-C43C-4408-BDBC-086AA01DDB93}"/>
+              </a:ext>
+            </a:extLst>
+          </p:cNvPr>
+          <p:cNvSpPr txBox="1"/>
+          <p:nvPr/>
+        </p:nvSpPr>
+        <p:spPr>
+          <a:xfrm>
+            <a:off x="9454671" y="1064551"/>
+            <a:ext cx="1144288" cy="369332"/>
+          </a:xfrm>
+          <a:prstGeom prst="rect">
+            <a:avLst/>
+          </a:prstGeom>
+          <a:noFill/>
+        </p:spPr>
+        <p:txBody>
+          <a:bodyPr wrap="none" rtlCol="0">
+            <a:spAutoFit/>
+          </a:bodyPr>
+          <a:lstStyle/>
+          <a:p>
+            <a:r>
+              <a:rPr lang="en-US" b="1" dirty="0">
+                <a:solidFill>
+                  <a:schemeClr val="bg1"/>
+                </a:solidFill>
+              </a:rPr>
+              <a:t>ZIDA 80% </a:t>
+            </a:r>
+          </a:p>
+        </p:txBody>
+      </p:sp>
     </p:spTree>
     <p:extLst>
       <p:ext uri="{BB962C8B-B14F-4D97-AF65-F5344CB8AC3E}">
-        <p14:creationId xmlns:p14="http://schemas.microsoft.com/office/powerpoint/2010/main" val="168574103"/>
+        <p14:creationId xmlns:p14="http://schemas.microsoft.com/office/powerpoint/2010/main" val="1156707321"/>
       </p:ext>
     </p:extLst>
   </p:cSld>
@@ -22020,69 +22248,391 @@
           <a:chExt cx="0" cy="0"/>
         </a:xfrm>
       </p:grpSpPr>
-      <p:cxnSp>
-        <p:nvCxnSpPr>
-          <p:cNvPr id="4" name="Straight Connector 3">
+      <p:sp>
+        <p:nvSpPr>
+          <p:cNvPr id="8" name="TextBox 7">
             <a:extLst>
               <a:ext uri="{FF2B5EF4-FFF2-40B4-BE49-F238E27FC236}">
-                <a16:creationId xmlns:a16="http://schemas.microsoft.com/office/drawing/2014/main" id="{AA0F51F3-860C-43CA-87DE-5828DBD4E939}"/>
+                <a16:creationId xmlns:a16="http://schemas.microsoft.com/office/drawing/2014/main" id="{1E7B805A-341E-4F9B-A482-5E5F4DFC7618}"/>
               </a:ext>
             </a:extLst>
           </p:cNvPr>
-          <p:cNvCxnSpPr/>
+          <p:cNvSpPr txBox="1"/>
           <p:nvPr/>
-        </p:nvCxnSpPr>
+        </p:nvSpPr>
         <p:spPr>
           <a:xfrm>
-            <a:off x="1569739" y="644666"/>
-            <a:ext cx="0" cy="690562"/>
+            <a:off x="964760" y="804328"/>
+            <a:ext cx="6091312" cy="1205821"/>
           </a:xfrm>
-          <a:prstGeom prst="line">
+          <a:prstGeom prst="rect">
             <a:avLst/>
           </a:prstGeom>
-          <a:ln w="28575"/>
         </p:spPr>
-        <p:style>
-          <a:lnRef idx="1">
-            <a:schemeClr val="accent1"/>
-          </a:lnRef>
-          <a:fillRef idx="0">
-            <a:schemeClr val="accent1"/>
-          </a:fillRef>
-          <a:effectRef idx="0">
-            <a:schemeClr val="accent1"/>
-          </a:effectRef>
-          <a:fontRef idx="minor">
-            <a:schemeClr val="tx1"/>
-          </a:fontRef>
-        </p:style>
-      </p:cxnSp>
+        <p:txBody>
+          <a:bodyPr vert="horz" lIns="91440" tIns="45720" rIns="91440" bIns="45720" rtlCol="0" anchor="ctr">
+            <a:normAutofit/>
+          </a:bodyPr>
+          <a:lstStyle/>
+          <a:p>
+            <a:pPr>
+              <a:lnSpc>
+                <a:spcPct val="90000"/>
+              </a:lnSpc>
+              <a:spcBef>
+                <a:spcPct val="0"/>
+              </a:spcBef>
+              <a:spcAft>
+                <a:spcPts val="600"/>
+              </a:spcAft>
+            </a:pPr>
+            <a:r>
+              <a:rPr lang="en-US" sz="2500" dirty="0">
+                <a:solidFill>
+                  <a:srgbClr val="FEFFFF"/>
+                </a:solidFill>
+                <a:latin typeface="+mj-lt"/>
+                <a:ea typeface="+mj-ea"/>
+                <a:cs typeface="+mj-cs"/>
+              </a:rPr>
+              <a:t>Compare surplus generation of ZID, ZIDP</a:t>
+            </a:r>
+          </a:p>
+          <a:p>
+            <a:pPr>
+              <a:lnSpc>
+                <a:spcPct val="90000"/>
+              </a:lnSpc>
+              <a:spcBef>
+                <a:spcPct val="0"/>
+              </a:spcBef>
+              <a:spcAft>
+                <a:spcPts val="600"/>
+              </a:spcAft>
+            </a:pPr>
+            <a:r>
+              <a:rPr lang="en-US" sz="2500" dirty="0">
+                <a:solidFill>
+                  <a:srgbClr val="FEFFFF"/>
+                </a:solidFill>
+                <a:latin typeface="+mj-lt"/>
+                <a:ea typeface="+mj-ea"/>
+                <a:cs typeface="+mj-cs"/>
+              </a:rPr>
+              <a:t>Note Narrow range on y-axis of graph</a:t>
+            </a:r>
+          </a:p>
+        </p:txBody>
+      </p:sp>
       <p:sp>
         <p:nvSpPr>
-          <p:cNvPr id="6" name="TextBox 3">
+          <p:cNvPr id="3" name="TextBox 2">
             <a:extLst>
               <a:ext uri="{FF2B5EF4-FFF2-40B4-BE49-F238E27FC236}">
-                <a16:creationId xmlns:a16="http://schemas.microsoft.com/office/drawing/2014/main" id="{F9A846BF-64EF-4AF8-A119-476064F3EB43}"/>
+                <a16:creationId xmlns:a16="http://schemas.microsoft.com/office/drawing/2014/main" id="{426B6423-DB43-4D45-BB8B-E5487B743FE5}"/>
               </a:ext>
             </a:extLst>
           </p:cNvPr>
-          <p:cNvSpPr txBox="1">
-            <a:spLocks noChangeArrowheads="1"/>
-          </p:cNvSpPr>
+          <p:cNvSpPr txBox="1"/>
           <p:nvPr/>
         </p:nvSpPr>
-        <p:spPr bwMode="auto">
+        <p:spPr>
           <a:xfrm>
-            <a:off x="1763414" y="627203"/>
-            <a:ext cx="2318392" cy="707886"/>
+            <a:off x="485484" y="2490513"/>
+            <a:ext cx="2575149" cy="3563159"/>
+          </a:xfrm>
+          <a:prstGeom prst="rect">
+            <a:avLst/>
+          </a:prstGeom>
+        </p:spPr>
+        <p:txBody>
+          <a:bodyPr vert="horz" lIns="91440" tIns="45720" rIns="91440" bIns="45720" rtlCol="0">
+            <a:normAutofit/>
+          </a:bodyPr>
+          <a:lstStyle/>
+          <a:p>
+            <a:pPr indent="-228600">
+              <a:lnSpc>
+                <a:spcPct val="90000"/>
+              </a:lnSpc>
+              <a:spcAft>
+                <a:spcPts val="600"/>
+              </a:spcAft>
+              <a:buFont typeface="Arial" panose="020B0604020202020204" pitchFamily="34" charset="0"/>
+              <a:buChar char="•"/>
+            </a:pPr>
+            <a:r>
+              <a:rPr lang="en-US" sz="2000" dirty="0" err="1"/>
+              <a:t>num_trials</a:t>
+            </a:r>
+            <a:r>
+              <a:rPr lang="en-US" sz="2000" dirty="0"/>
+              <a:t> = 100</a:t>
+            </a:r>
+          </a:p>
+          <a:p>
+            <a:pPr indent="-228600">
+              <a:lnSpc>
+                <a:spcPct val="90000"/>
+              </a:lnSpc>
+              <a:spcAft>
+                <a:spcPts val="600"/>
+              </a:spcAft>
+              <a:buFont typeface="Arial" panose="020B0604020202020204" pitchFamily="34" charset="0"/>
+              <a:buChar char="•"/>
+            </a:pPr>
+            <a:r>
+              <a:rPr lang="en-US" sz="2000" dirty="0"/>
+              <a:t>begin event = 48</a:t>
+            </a:r>
+          </a:p>
+          <a:p>
+            <a:pPr indent="-228600">
+              <a:lnSpc>
+                <a:spcPct val="90000"/>
+              </a:lnSpc>
+              <a:spcAft>
+                <a:spcPts val="600"/>
+              </a:spcAft>
+              <a:buFont typeface="Arial" panose="020B0604020202020204" pitchFamily="34" charset="0"/>
+              <a:buChar char="•"/>
+            </a:pPr>
+            <a:r>
+              <a:rPr lang="en-US" sz="2000" dirty="0"/>
+              <a:t>end event  = 52</a:t>
+            </a:r>
+          </a:p>
+          <a:p>
+            <a:pPr indent="-228600">
+              <a:lnSpc>
+                <a:spcPct val="90000"/>
+              </a:lnSpc>
+              <a:spcAft>
+                <a:spcPts val="600"/>
+              </a:spcAft>
+              <a:buFont typeface="Arial" panose="020B0604020202020204" pitchFamily="34" charset="0"/>
+              <a:buChar char="•"/>
+            </a:pPr>
+            <a:r>
+              <a:rPr lang="en-US" sz="2000" dirty="0" err="1"/>
+              <a:t>num_periods</a:t>
+            </a:r>
+            <a:r>
+              <a:rPr lang="en-US" sz="2000" dirty="0"/>
+              <a:t> = 7</a:t>
+            </a:r>
+          </a:p>
+          <a:p>
+            <a:pPr indent="-228600">
+              <a:lnSpc>
+                <a:spcPct val="90000"/>
+              </a:lnSpc>
+              <a:spcAft>
+                <a:spcPts val="600"/>
+              </a:spcAft>
+              <a:buFont typeface="Arial" panose="020B0604020202020204" pitchFamily="34" charset="0"/>
+              <a:buChar char="•"/>
+            </a:pPr>
+            <a:r>
+              <a:rPr lang="en-US" sz="2000" dirty="0" err="1"/>
+              <a:t>num_weeks</a:t>
+            </a:r>
+            <a:r>
+              <a:rPr lang="en-US" sz="2000" dirty="0"/>
+              <a:t> = 50</a:t>
+            </a:r>
+          </a:p>
+          <a:p>
+            <a:pPr indent="-228600">
+              <a:lnSpc>
+                <a:spcPct val="90000"/>
+              </a:lnSpc>
+              <a:spcAft>
+                <a:spcPts val="600"/>
+              </a:spcAft>
+              <a:buFont typeface="Arial" panose="020B0604020202020204" pitchFamily="34" charset="0"/>
+              <a:buChar char="•"/>
+            </a:pPr>
+            <a:r>
+              <a:rPr lang="en-US" sz="2000" dirty="0" err="1"/>
+              <a:t>num_rounds</a:t>
+            </a:r>
+            <a:r>
+              <a:rPr lang="en-US" sz="2000" dirty="0"/>
+              <a:t> = 5</a:t>
+            </a:r>
+          </a:p>
+          <a:p>
+            <a:pPr indent="-228600">
+              <a:lnSpc>
+                <a:spcPct val="90000"/>
+              </a:lnSpc>
+              <a:spcAft>
+                <a:spcPts val="600"/>
+              </a:spcAft>
+              <a:buFont typeface="Arial" panose="020B0604020202020204" pitchFamily="34" charset="0"/>
+              <a:buChar char="•"/>
+            </a:pPr>
+            <a:r>
+              <a:rPr lang="en-US" sz="2000" dirty="0" err="1"/>
+              <a:t>num_traders</a:t>
+            </a:r>
+            <a:r>
+              <a:rPr lang="en-US" sz="2000" dirty="0"/>
+              <a:t> = 20</a:t>
+            </a:r>
+          </a:p>
+          <a:p>
+            <a:pPr indent="-228600">
+              <a:lnSpc>
+                <a:spcPct val="90000"/>
+              </a:lnSpc>
+              <a:spcAft>
+                <a:spcPts val="600"/>
+              </a:spcAft>
+              <a:buFont typeface="Arial" panose="020B0604020202020204" pitchFamily="34" charset="0"/>
+              <a:buChar char="•"/>
+            </a:pPr>
+            <a:r>
+              <a:rPr lang="en-US" sz="2000" dirty="0" err="1"/>
+              <a:t>num_units</a:t>
+            </a:r>
+            <a:r>
+              <a:rPr lang="en-US" sz="2000" dirty="0"/>
+              <a:t> = 8</a:t>
+            </a:r>
+          </a:p>
+          <a:p>
+            <a:pPr indent="-228600">
+              <a:lnSpc>
+                <a:spcPct val="90000"/>
+              </a:lnSpc>
+              <a:spcAft>
+                <a:spcPts val="600"/>
+              </a:spcAft>
+              <a:buFont typeface="Arial" panose="020B0604020202020204" pitchFamily="34" charset="0"/>
+              <a:buChar char="•"/>
+            </a:pPr>
+            <a:r>
+              <a:rPr lang="en-US" sz="2000" dirty="0" err="1"/>
+              <a:t>lower_bound</a:t>
+            </a:r>
+            <a:r>
+              <a:rPr lang="en-US" sz="2000" dirty="0"/>
+              <a:t> = 200 </a:t>
+            </a:r>
+          </a:p>
+          <a:p>
+            <a:pPr indent="-228600">
+              <a:lnSpc>
+                <a:spcPct val="90000"/>
+              </a:lnSpc>
+              <a:spcAft>
+                <a:spcPts val="600"/>
+              </a:spcAft>
+              <a:buFont typeface="Arial" panose="020B0604020202020204" pitchFamily="34" charset="0"/>
+              <a:buChar char="•"/>
+            </a:pPr>
+            <a:r>
+              <a:rPr lang="en-US" sz="2000" dirty="0" err="1"/>
+              <a:t>upper_bound</a:t>
+            </a:r>
+            <a:r>
+              <a:rPr lang="en-US" sz="2000" dirty="0"/>
+              <a:t> = 600</a:t>
+            </a:r>
+          </a:p>
+        </p:txBody>
+      </p:sp>
+      <p:sp>
+        <p:nvSpPr>
+          <p:cNvPr id="17" name="TextBox 16">
+            <a:extLst>
+              <a:ext uri="{FF2B5EF4-FFF2-40B4-BE49-F238E27FC236}">
+                <a16:creationId xmlns:a16="http://schemas.microsoft.com/office/drawing/2014/main" id="{B5F28098-4590-4467-A522-7CAF73B2CE02}"/>
+              </a:ext>
+            </a:extLst>
+          </p:cNvPr>
+          <p:cNvSpPr txBox="1"/>
+          <p:nvPr/>
+        </p:nvSpPr>
+        <p:spPr>
+          <a:xfrm>
+            <a:off x="4436403" y="5567935"/>
+            <a:ext cx="2860048" cy="341632"/>
           </a:xfrm>
           <a:prstGeom prst="rect">
             <a:avLst/>
           </a:prstGeom>
           <a:noFill/>
-          <a:ln>
-            <a:noFill/>
-          </a:ln>
+        </p:spPr>
+        <p:txBody>
+          <a:bodyPr wrap="square">
+            <a:spAutoFit/>
+          </a:bodyPr>
+          <a:lstStyle/>
+          <a:p>
+            <a:pPr indent="-228600">
+              <a:lnSpc>
+                <a:spcPct val="90000"/>
+              </a:lnSpc>
+              <a:spcAft>
+                <a:spcPts val="600"/>
+              </a:spcAft>
+              <a:buFont typeface="Arial" panose="020B0604020202020204" pitchFamily="34" charset="0"/>
+              <a:buChar char="•"/>
+            </a:pPr>
+            <a:r>
+              <a:rPr lang="en-US" sz="1800" dirty="0"/>
+              <a:t>100% ZIDPR </a:t>
+            </a:r>
+            <a:r>
+              <a:rPr lang="en-US" dirty="0"/>
+              <a:t>during</a:t>
+            </a:r>
+            <a:r>
+              <a:rPr lang="en-US" sz="1800" dirty="0"/>
+              <a:t> event</a:t>
+            </a:r>
+          </a:p>
+        </p:txBody>
+      </p:sp>
+      <p:pic>
+        <p:nvPicPr>
+          <p:cNvPr id="1026" name="Picture 2">
+            <a:extLst>
+              <a:ext uri="{FF2B5EF4-FFF2-40B4-BE49-F238E27FC236}">
+                <a16:creationId xmlns:a16="http://schemas.microsoft.com/office/drawing/2014/main" id="{85007001-4007-4D71-8084-FE3DA90E824E}"/>
+              </a:ext>
+            </a:extLst>
+          </p:cNvPr>
+          <p:cNvPicPr>
+            <a:picLocks noChangeAspect="1" noChangeArrowheads="1"/>
+          </p:cNvPicPr>
+          <p:nvPr/>
+        </p:nvPicPr>
+        <p:blipFill>
+          <a:blip r:embed="rId2">
+            <a:extLst>
+              <a:ext uri="{28A0092B-C50C-407E-A947-70E740481C1C}">
+                <a14:useLocalDpi xmlns:a14="http://schemas.microsoft.com/office/drawing/2010/main" val="0"/>
+              </a:ext>
+            </a:extLst>
+          </a:blip>
+          <a:srcRect/>
+          <a:stretch>
+            <a:fillRect/>
+          </a:stretch>
+        </p:blipFill>
+        <p:spPr bwMode="auto">
+          <a:xfrm>
+            <a:off x="3631430" y="2091273"/>
+            <a:ext cx="4236017" cy="3390167"/>
+          </a:xfrm>
+          <a:prstGeom prst="rect">
+            <a:avLst/>
+          </a:prstGeom>
+          <a:noFill/>
           <a:extLst>
             <a:ext uri="{909E8E84-426E-40DD-AFC4-6F175D3DCCD1}">
               <a14:hiddenFill xmlns:a14="http://schemas.microsoft.com/office/drawing/2010/main">
@@ -22091,202 +22641,117 @@
                 </a:solidFill>
               </a14:hiddenFill>
             </a:ext>
-            <a:ext uri="{91240B29-F687-4F45-9708-019B960494DF}">
-              <a14:hiddenLine xmlns:a14="http://schemas.microsoft.com/office/drawing/2010/main" w="9525">
-                <a:solidFill>
-                  <a:srgbClr val="000000"/>
-                </a:solidFill>
-                <a:miter lim="800000"/>
-                <a:headEnd/>
-                <a:tailEnd/>
-              </a14:hiddenLine>
+          </a:extLst>
+        </p:spPr>
+      </p:pic>
+      <p:sp>
+        <p:nvSpPr>
+          <p:cNvPr id="15" name="TextBox 14">
+            <a:extLst>
+              <a:ext uri="{FF2B5EF4-FFF2-40B4-BE49-F238E27FC236}">
+                <a16:creationId xmlns:a16="http://schemas.microsoft.com/office/drawing/2014/main" id="{69C1BEB7-7D02-4209-874E-7E1EDC3D2DE9}"/>
+              </a:ext>
+            </a:extLst>
+          </p:cNvPr>
+          <p:cNvSpPr txBox="1"/>
+          <p:nvPr/>
+        </p:nvSpPr>
+        <p:spPr>
+          <a:xfrm>
+            <a:off x="8846468" y="5567935"/>
+            <a:ext cx="2860048" cy="341632"/>
+          </a:xfrm>
+          <a:prstGeom prst="rect">
+            <a:avLst/>
+          </a:prstGeom>
+          <a:noFill/>
+        </p:spPr>
+        <p:txBody>
+          <a:bodyPr wrap="square">
+            <a:spAutoFit/>
+          </a:bodyPr>
+          <a:lstStyle/>
+          <a:p>
+            <a:pPr indent="-228600">
+              <a:lnSpc>
+                <a:spcPct val="90000"/>
+              </a:lnSpc>
+              <a:spcAft>
+                <a:spcPts val="600"/>
+              </a:spcAft>
+              <a:buFont typeface="Arial" panose="020B0604020202020204" pitchFamily="34" charset="0"/>
+              <a:buChar char="•"/>
+            </a:pPr>
+            <a:r>
+              <a:rPr lang="en-US" dirty="0"/>
+              <a:t>30</a:t>
+            </a:r>
+            <a:r>
+              <a:rPr lang="en-US" sz="1800" dirty="0"/>
+              <a:t>% ZIDPR </a:t>
+            </a:r>
+            <a:r>
+              <a:rPr lang="en-US" dirty="0"/>
+              <a:t>during</a:t>
+            </a:r>
+            <a:r>
+              <a:rPr lang="en-US" sz="1800" dirty="0"/>
+              <a:t> event</a:t>
+            </a:r>
+          </a:p>
+        </p:txBody>
+      </p:sp>
+      <p:pic>
+        <p:nvPicPr>
+          <p:cNvPr id="2" name="Picture 4">
+            <a:extLst>
+              <a:ext uri="{FF2B5EF4-FFF2-40B4-BE49-F238E27FC236}">
+                <a16:creationId xmlns:a16="http://schemas.microsoft.com/office/drawing/2014/main" id="{5156A450-80E4-4602-8276-096FEACD1792}"/>
+              </a:ext>
+            </a:extLst>
+          </p:cNvPr>
+          <p:cNvPicPr>
+            <a:picLocks noChangeAspect="1" noChangeArrowheads="1"/>
+          </p:cNvPicPr>
+          <p:nvPr/>
+        </p:nvPicPr>
+        <p:blipFill>
+          <a:blip r:embed="rId3">
+            <a:extLst>
+              <a:ext uri="{28A0092B-C50C-407E-A947-70E740481C1C}">
+                <a14:useLocalDpi xmlns:a14="http://schemas.microsoft.com/office/drawing/2010/main" val="0"/>
+              </a:ext>
+            </a:extLst>
+          </a:blip>
+          <a:srcRect/>
+          <a:stretch>
+            <a:fillRect/>
+          </a:stretch>
+        </p:blipFill>
+        <p:spPr bwMode="auto">
+          <a:xfrm>
+            <a:off x="7940451" y="2091272"/>
+            <a:ext cx="4119028" cy="3296538"/>
+          </a:xfrm>
+          <a:prstGeom prst="rect">
+            <a:avLst/>
+          </a:prstGeom>
+          <a:noFill/>
+          <a:extLst>
+            <a:ext uri="{909E8E84-426E-40DD-AFC4-6F175D3DCCD1}">
+              <a14:hiddenFill xmlns:a14="http://schemas.microsoft.com/office/drawing/2010/main">
+                <a:solidFill>
+                  <a:srgbClr val="FFFFFF"/>
+                </a:solidFill>
+              </a14:hiddenFill>
             </a:ext>
           </a:extLst>
         </p:spPr>
-        <p:txBody>
-          <a:bodyPr wrap="none">
-            <a:spAutoFit/>
-          </a:bodyPr>
-          <a:lstStyle>
-            <a:lvl1pPr>
-              <a:lnSpc>
-                <a:spcPct val="90000"/>
-              </a:lnSpc>
-              <a:spcBef>
-                <a:spcPts val="1000"/>
-              </a:spcBef>
-              <a:buFont typeface="Arial" panose="020B0604020202020204" pitchFamily="34" charset="0"/>
-              <a:buChar char="•"/>
-              <a:defRPr sz="2800">
-                <a:solidFill>
-                  <a:schemeClr val="tx1"/>
-                </a:solidFill>
-                <a:latin typeface="Calibri" panose="020F0502020204030204" pitchFamily="34" charset="0"/>
-              </a:defRPr>
-            </a:lvl1pPr>
-            <a:lvl2pPr marL="742950" indent="-285750">
-              <a:lnSpc>
-                <a:spcPct val="90000"/>
-              </a:lnSpc>
-              <a:spcBef>
-                <a:spcPts val="500"/>
-              </a:spcBef>
-              <a:buFont typeface="Arial" panose="020B0604020202020204" pitchFamily="34" charset="0"/>
-              <a:buChar char="•"/>
-              <a:defRPr sz="2400">
-                <a:solidFill>
-                  <a:schemeClr val="tx1"/>
-                </a:solidFill>
-                <a:latin typeface="Calibri" panose="020F0502020204030204" pitchFamily="34" charset="0"/>
-              </a:defRPr>
-            </a:lvl2pPr>
-            <a:lvl3pPr marL="1143000" indent="-228600">
-              <a:lnSpc>
-                <a:spcPct val="90000"/>
-              </a:lnSpc>
-              <a:spcBef>
-                <a:spcPts val="500"/>
-              </a:spcBef>
-              <a:buFont typeface="Arial" panose="020B0604020202020204" pitchFamily="34" charset="0"/>
-              <a:buChar char="•"/>
-              <a:defRPr sz="2000">
-                <a:solidFill>
-                  <a:schemeClr val="tx1"/>
-                </a:solidFill>
-                <a:latin typeface="Calibri" panose="020F0502020204030204" pitchFamily="34" charset="0"/>
-              </a:defRPr>
-            </a:lvl3pPr>
-            <a:lvl4pPr marL="1600200" indent="-228600">
-              <a:lnSpc>
-                <a:spcPct val="90000"/>
-              </a:lnSpc>
-              <a:spcBef>
-                <a:spcPts val="500"/>
-              </a:spcBef>
-              <a:buFont typeface="Arial" panose="020B0604020202020204" pitchFamily="34" charset="0"/>
-              <a:buChar char="•"/>
-              <a:defRPr>
-                <a:solidFill>
-                  <a:schemeClr val="tx1"/>
-                </a:solidFill>
-                <a:latin typeface="Calibri" panose="020F0502020204030204" pitchFamily="34" charset="0"/>
-              </a:defRPr>
-            </a:lvl4pPr>
-            <a:lvl5pPr marL="2057400" indent="-228600">
-              <a:lnSpc>
-                <a:spcPct val="90000"/>
-              </a:lnSpc>
-              <a:spcBef>
-                <a:spcPts val="500"/>
-              </a:spcBef>
-              <a:buFont typeface="Arial" panose="020B0604020202020204" pitchFamily="34" charset="0"/>
-              <a:buChar char="•"/>
-              <a:defRPr>
-                <a:solidFill>
-                  <a:schemeClr val="tx1"/>
-                </a:solidFill>
-                <a:latin typeface="Calibri" panose="020F0502020204030204" pitchFamily="34" charset="0"/>
-              </a:defRPr>
-            </a:lvl5pPr>
-            <a:lvl6pPr marL="2514600" indent="-228600" eaLnBrk="0" fontAlgn="base" hangingPunct="0">
-              <a:lnSpc>
-                <a:spcPct val="90000"/>
-              </a:lnSpc>
-              <a:spcBef>
-                <a:spcPts val="500"/>
-              </a:spcBef>
-              <a:spcAft>
-                <a:spcPct val="0"/>
-              </a:spcAft>
-              <a:buFont typeface="Arial" panose="020B0604020202020204" pitchFamily="34" charset="0"/>
-              <a:buChar char="•"/>
-              <a:defRPr>
-                <a:solidFill>
-                  <a:schemeClr val="tx1"/>
-                </a:solidFill>
-                <a:latin typeface="Calibri" panose="020F0502020204030204" pitchFamily="34" charset="0"/>
-              </a:defRPr>
-            </a:lvl6pPr>
-            <a:lvl7pPr marL="2971800" indent="-228600" eaLnBrk="0" fontAlgn="base" hangingPunct="0">
-              <a:lnSpc>
-                <a:spcPct val="90000"/>
-              </a:lnSpc>
-              <a:spcBef>
-                <a:spcPts val="500"/>
-              </a:spcBef>
-              <a:spcAft>
-                <a:spcPct val="0"/>
-              </a:spcAft>
-              <a:buFont typeface="Arial" panose="020B0604020202020204" pitchFamily="34" charset="0"/>
-              <a:buChar char="•"/>
-              <a:defRPr>
-                <a:solidFill>
-                  <a:schemeClr val="tx1"/>
-                </a:solidFill>
-                <a:latin typeface="Calibri" panose="020F0502020204030204" pitchFamily="34" charset="0"/>
-              </a:defRPr>
-            </a:lvl7pPr>
-            <a:lvl8pPr marL="3429000" indent="-228600" eaLnBrk="0" fontAlgn="base" hangingPunct="0">
-              <a:lnSpc>
-                <a:spcPct val="90000"/>
-              </a:lnSpc>
-              <a:spcBef>
-                <a:spcPts val="500"/>
-              </a:spcBef>
-              <a:spcAft>
-                <a:spcPct val="0"/>
-              </a:spcAft>
-              <a:buFont typeface="Arial" panose="020B0604020202020204" pitchFamily="34" charset="0"/>
-              <a:buChar char="•"/>
-              <a:defRPr>
-                <a:solidFill>
-                  <a:schemeClr val="tx1"/>
-                </a:solidFill>
-                <a:latin typeface="Calibri" panose="020F0502020204030204" pitchFamily="34" charset="0"/>
-              </a:defRPr>
-            </a:lvl8pPr>
-            <a:lvl9pPr marL="3886200" indent="-228600" eaLnBrk="0" fontAlgn="base" hangingPunct="0">
-              <a:lnSpc>
-                <a:spcPct val="90000"/>
-              </a:lnSpc>
-              <a:spcBef>
-                <a:spcPts val="500"/>
-              </a:spcBef>
-              <a:spcAft>
-                <a:spcPct val="0"/>
-              </a:spcAft>
-              <a:buFont typeface="Arial" panose="020B0604020202020204" pitchFamily="34" charset="0"/>
-              <a:buChar char="•"/>
-              <a:defRPr>
-                <a:solidFill>
-                  <a:schemeClr val="tx1"/>
-                </a:solidFill>
-                <a:latin typeface="Calibri" panose="020F0502020204030204" pitchFamily="34" charset="0"/>
-              </a:defRPr>
-            </a:lvl9pPr>
-          </a:lstStyle>
-          <a:p>
-            <a:pPr eaLnBrk="1" hangingPunct="1">
-              <a:lnSpc>
-                <a:spcPct val="100000"/>
-              </a:lnSpc>
-              <a:spcBef>
-                <a:spcPct val="0"/>
-              </a:spcBef>
-              <a:buFontTx/>
-              <a:buNone/>
-            </a:pPr>
-            <a:r>
-              <a:rPr lang="en-US" altLang="en-US" sz="4000" dirty="0"/>
-              <a:t>Thank You</a:t>
-            </a:r>
-          </a:p>
-        </p:txBody>
-      </p:sp>
+      </p:pic>
     </p:spTree>
     <p:extLst>
       <p:ext uri="{BB962C8B-B14F-4D97-AF65-F5344CB8AC3E}">
-        <p14:creationId xmlns:p14="http://schemas.microsoft.com/office/powerpoint/2010/main" val="2791261846"/>
+        <p14:creationId xmlns:p14="http://schemas.microsoft.com/office/powerpoint/2010/main" val="1845725964"/>
       </p:ext>
     </p:extLst>
   </p:cSld>
@@ -22690,6 +23155,423 @@
           <a:chExt cx="0" cy="0"/>
         </a:xfrm>
       </p:grpSpPr>
+      <p:pic>
+        <p:nvPicPr>
+          <p:cNvPr id="2" name="Picture 6">
+            <a:extLst>
+              <a:ext uri="{FF2B5EF4-FFF2-40B4-BE49-F238E27FC236}">
+                <a16:creationId xmlns:a16="http://schemas.microsoft.com/office/drawing/2014/main" id="{D79447AF-EBEE-428E-8923-1BB6F5F5D007}"/>
+              </a:ext>
+            </a:extLst>
+          </p:cNvPr>
+          <p:cNvPicPr>
+            <a:picLocks noChangeAspect="1" noChangeArrowheads="1"/>
+          </p:cNvPicPr>
+          <p:nvPr/>
+        </p:nvPicPr>
+        <p:blipFill>
+          <a:blip r:embed="rId2">
+            <a:extLst>
+              <a:ext uri="{28A0092B-C50C-407E-A947-70E740481C1C}">
+                <a14:useLocalDpi xmlns:a14="http://schemas.microsoft.com/office/drawing/2010/main" val="0"/>
+              </a:ext>
+            </a:extLst>
+          </a:blip>
+          <a:srcRect/>
+          <a:stretch>
+            <a:fillRect/>
+          </a:stretch>
+        </p:blipFill>
+        <p:spPr bwMode="auto">
+          <a:xfrm>
+            <a:off x="-100330" y="145793"/>
+            <a:ext cx="5962650" cy="4772025"/>
+          </a:xfrm>
+          <a:prstGeom prst="rect">
+            <a:avLst/>
+          </a:prstGeom>
+          <a:noFill/>
+          <a:extLst>
+            <a:ext uri="{909E8E84-426E-40DD-AFC4-6F175D3DCCD1}">
+              <a14:hiddenFill xmlns:a14="http://schemas.microsoft.com/office/drawing/2010/main">
+                <a:solidFill>
+                  <a:srgbClr val="FFFFFF"/>
+                </a:solidFill>
+              </a14:hiddenFill>
+            </a:ext>
+          </a:extLst>
+        </p:spPr>
+      </p:pic>
+      <p:pic>
+        <p:nvPicPr>
+          <p:cNvPr id="2050" name="Picture 2">
+            <a:extLst>
+              <a:ext uri="{FF2B5EF4-FFF2-40B4-BE49-F238E27FC236}">
+                <a16:creationId xmlns:a16="http://schemas.microsoft.com/office/drawing/2014/main" id="{E2CCAFDB-4A51-46D4-B8C0-A9A8581E9055}"/>
+              </a:ext>
+            </a:extLst>
+          </p:cNvPr>
+          <p:cNvPicPr>
+            <a:picLocks noChangeAspect="1" noChangeArrowheads="1"/>
+          </p:cNvPicPr>
+          <p:nvPr/>
+        </p:nvPicPr>
+        <p:blipFill>
+          <a:blip r:embed="rId3">
+            <a:extLst>
+              <a:ext uri="{28A0092B-C50C-407E-A947-70E740481C1C}">
+                <a14:useLocalDpi xmlns:a14="http://schemas.microsoft.com/office/drawing/2010/main" val="0"/>
+              </a:ext>
+            </a:extLst>
+          </a:blip>
+          <a:srcRect/>
+          <a:stretch>
+            <a:fillRect/>
+          </a:stretch>
+        </p:blipFill>
+        <p:spPr bwMode="auto">
+          <a:xfrm>
+            <a:off x="5634355" y="145793"/>
+            <a:ext cx="5962650" cy="4772025"/>
+          </a:xfrm>
+          <a:prstGeom prst="rect">
+            <a:avLst/>
+          </a:prstGeom>
+          <a:noFill/>
+          <a:extLst>
+            <a:ext uri="{909E8E84-426E-40DD-AFC4-6F175D3DCCD1}">
+              <a14:hiddenFill xmlns:a14="http://schemas.microsoft.com/office/drawing/2010/main">
+                <a:solidFill>
+                  <a:srgbClr val="FFFFFF"/>
+                </a:solidFill>
+              </a14:hiddenFill>
+            </a:ext>
+          </a:extLst>
+        </p:spPr>
+      </p:pic>
+    </p:spTree>
+    <p:extLst>
+      <p:ext uri="{BB962C8B-B14F-4D97-AF65-F5344CB8AC3E}">
+        <p14:creationId xmlns:p14="http://schemas.microsoft.com/office/powerpoint/2010/main" val="523039214"/>
+      </p:ext>
+    </p:extLst>
+  </p:cSld>
+  <p:clrMapOvr>
+    <a:masterClrMapping/>
+  </p:clrMapOvr>
+</p:sld>
+</file>
+
+<file path=ppt/slides/slide31.xml><?xml version="1.0" encoding="utf-8"?>
+<p:sld xmlns:a="http://schemas.openxmlformats.org/drawingml/2006/main" xmlns:r="http://schemas.openxmlformats.org/officeDocument/2006/relationships" xmlns:p="http://schemas.openxmlformats.org/presentationml/2006/main">
+  <p:cSld>
+    <p:spTree>
+      <p:nvGrpSpPr>
+        <p:cNvPr id="1" name=""/>
+        <p:cNvGrpSpPr/>
+        <p:nvPr/>
+      </p:nvGrpSpPr>
+      <p:grpSpPr>
+        <a:xfrm>
+          <a:off x="0" y="0"/>
+          <a:ext cx="0" cy="0"/>
+          <a:chOff x="0" y="0"/>
+          <a:chExt cx="0" cy="0"/>
+        </a:xfrm>
+      </p:grpSpPr>
+      <p:cxnSp>
+        <p:nvCxnSpPr>
+          <p:cNvPr id="4" name="Straight Connector 3">
+            <a:extLst>
+              <a:ext uri="{FF2B5EF4-FFF2-40B4-BE49-F238E27FC236}">
+                <a16:creationId xmlns:a16="http://schemas.microsoft.com/office/drawing/2014/main" id="{AA0F51F3-860C-43CA-87DE-5828DBD4E939}"/>
+              </a:ext>
+            </a:extLst>
+          </p:cNvPr>
+          <p:cNvCxnSpPr/>
+          <p:nvPr/>
+        </p:nvCxnSpPr>
+        <p:spPr>
+          <a:xfrm>
+            <a:off x="1569739" y="644666"/>
+            <a:ext cx="0" cy="690562"/>
+          </a:xfrm>
+          <a:prstGeom prst="line">
+            <a:avLst/>
+          </a:prstGeom>
+          <a:ln w="28575"/>
+        </p:spPr>
+        <p:style>
+          <a:lnRef idx="1">
+            <a:schemeClr val="accent1"/>
+          </a:lnRef>
+          <a:fillRef idx="0">
+            <a:schemeClr val="accent1"/>
+          </a:fillRef>
+          <a:effectRef idx="0">
+            <a:schemeClr val="accent1"/>
+          </a:effectRef>
+          <a:fontRef idx="minor">
+            <a:schemeClr val="tx1"/>
+          </a:fontRef>
+        </p:style>
+      </p:cxnSp>
+      <p:sp>
+        <p:nvSpPr>
+          <p:cNvPr id="6" name="TextBox 3">
+            <a:extLst>
+              <a:ext uri="{FF2B5EF4-FFF2-40B4-BE49-F238E27FC236}">
+                <a16:creationId xmlns:a16="http://schemas.microsoft.com/office/drawing/2014/main" id="{F9A846BF-64EF-4AF8-A119-476064F3EB43}"/>
+              </a:ext>
+            </a:extLst>
+          </p:cNvPr>
+          <p:cNvSpPr txBox="1">
+            <a:spLocks noChangeArrowheads="1"/>
+          </p:cNvSpPr>
+          <p:nvPr/>
+        </p:nvSpPr>
+        <p:spPr bwMode="auto">
+          <a:xfrm>
+            <a:off x="1763414" y="627203"/>
+            <a:ext cx="2318392" cy="707886"/>
+          </a:xfrm>
+          <a:prstGeom prst="rect">
+            <a:avLst/>
+          </a:prstGeom>
+          <a:noFill/>
+          <a:ln>
+            <a:noFill/>
+          </a:ln>
+          <a:extLst>
+            <a:ext uri="{909E8E84-426E-40DD-AFC4-6F175D3DCCD1}">
+              <a14:hiddenFill xmlns:a14="http://schemas.microsoft.com/office/drawing/2010/main">
+                <a:solidFill>
+                  <a:srgbClr val="FFFFFF"/>
+                </a:solidFill>
+              </a14:hiddenFill>
+            </a:ext>
+            <a:ext uri="{91240B29-F687-4F45-9708-019B960494DF}">
+              <a14:hiddenLine xmlns:a14="http://schemas.microsoft.com/office/drawing/2010/main" w="9525">
+                <a:solidFill>
+                  <a:srgbClr val="000000"/>
+                </a:solidFill>
+                <a:miter lim="800000"/>
+                <a:headEnd/>
+                <a:tailEnd/>
+              </a14:hiddenLine>
+            </a:ext>
+          </a:extLst>
+        </p:spPr>
+        <p:txBody>
+          <a:bodyPr wrap="none">
+            <a:spAutoFit/>
+          </a:bodyPr>
+          <a:lstStyle>
+            <a:lvl1pPr>
+              <a:lnSpc>
+                <a:spcPct val="90000"/>
+              </a:lnSpc>
+              <a:spcBef>
+                <a:spcPts val="1000"/>
+              </a:spcBef>
+              <a:buFont typeface="Arial" panose="020B0604020202020204" pitchFamily="34" charset="0"/>
+              <a:buChar char="•"/>
+              <a:defRPr sz="2800">
+                <a:solidFill>
+                  <a:schemeClr val="tx1"/>
+                </a:solidFill>
+                <a:latin typeface="Calibri" panose="020F0502020204030204" pitchFamily="34" charset="0"/>
+              </a:defRPr>
+            </a:lvl1pPr>
+            <a:lvl2pPr marL="742950" indent="-285750">
+              <a:lnSpc>
+                <a:spcPct val="90000"/>
+              </a:lnSpc>
+              <a:spcBef>
+                <a:spcPts val="500"/>
+              </a:spcBef>
+              <a:buFont typeface="Arial" panose="020B0604020202020204" pitchFamily="34" charset="0"/>
+              <a:buChar char="•"/>
+              <a:defRPr sz="2400">
+                <a:solidFill>
+                  <a:schemeClr val="tx1"/>
+                </a:solidFill>
+                <a:latin typeface="Calibri" panose="020F0502020204030204" pitchFamily="34" charset="0"/>
+              </a:defRPr>
+            </a:lvl2pPr>
+            <a:lvl3pPr marL="1143000" indent="-228600">
+              <a:lnSpc>
+                <a:spcPct val="90000"/>
+              </a:lnSpc>
+              <a:spcBef>
+                <a:spcPts val="500"/>
+              </a:spcBef>
+              <a:buFont typeface="Arial" panose="020B0604020202020204" pitchFamily="34" charset="0"/>
+              <a:buChar char="•"/>
+              <a:defRPr sz="2000">
+                <a:solidFill>
+                  <a:schemeClr val="tx1"/>
+                </a:solidFill>
+                <a:latin typeface="Calibri" panose="020F0502020204030204" pitchFamily="34" charset="0"/>
+              </a:defRPr>
+            </a:lvl3pPr>
+            <a:lvl4pPr marL="1600200" indent="-228600">
+              <a:lnSpc>
+                <a:spcPct val="90000"/>
+              </a:lnSpc>
+              <a:spcBef>
+                <a:spcPts val="500"/>
+              </a:spcBef>
+              <a:buFont typeface="Arial" panose="020B0604020202020204" pitchFamily="34" charset="0"/>
+              <a:buChar char="•"/>
+              <a:defRPr>
+                <a:solidFill>
+                  <a:schemeClr val="tx1"/>
+                </a:solidFill>
+                <a:latin typeface="Calibri" panose="020F0502020204030204" pitchFamily="34" charset="0"/>
+              </a:defRPr>
+            </a:lvl4pPr>
+            <a:lvl5pPr marL="2057400" indent="-228600">
+              <a:lnSpc>
+                <a:spcPct val="90000"/>
+              </a:lnSpc>
+              <a:spcBef>
+                <a:spcPts val="500"/>
+              </a:spcBef>
+              <a:buFont typeface="Arial" panose="020B0604020202020204" pitchFamily="34" charset="0"/>
+              <a:buChar char="•"/>
+              <a:defRPr>
+                <a:solidFill>
+                  <a:schemeClr val="tx1"/>
+                </a:solidFill>
+                <a:latin typeface="Calibri" panose="020F0502020204030204" pitchFamily="34" charset="0"/>
+              </a:defRPr>
+            </a:lvl5pPr>
+            <a:lvl6pPr marL="2514600" indent="-228600" eaLnBrk="0" fontAlgn="base" hangingPunct="0">
+              <a:lnSpc>
+                <a:spcPct val="90000"/>
+              </a:lnSpc>
+              <a:spcBef>
+                <a:spcPts val="500"/>
+              </a:spcBef>
+              <a:spcAft>
+                <a:spcPct val="0"/>
+              </a:spcAft>
+              <a:buFont typeface="Arial" panose="020B0604020202020204" pitchFamily="34" charset="0"/>
+              <a:buChar char="•"/>
+              <a:defRPr>
+                <a:solidFill>
+                  <a:schemeClr val="tx1"/>
+                </a:solidFill>
+                <a:latin typeface="Calibri" panose="020F0502020204030204" pitchFamily="34" charset="0"/>
+              </a:defRPr>
+            </a:lvl6pPr>
+            <a:lvl7pPr marL="2971800" indent="-228600" eaLnBrk="0" fontAlgn="base" hangingPunct="0">
+              <a:lnSpc>
+                <a:spcPct val="90000"/>
+              </a:lnSpc>
+              <a:spcBef>
+                <a:spcPts val="500"/>
+              </a:spcBef>
+              <a:spcAft>
+                <a:spcPct val="0"/>
+              </a:spcAft>
+              <a:buFont typeface="Arial" panose="020B0604020202020204" pitchFamily="34" charset="0"/>
+              <a:buChar char="•"/>
+              <a:defRPr>
+                <a:solidFill>
+                  <a:schemeClr val="tx1"/>
+                </a:solidFill>
+                <a:latin typeface="Calibri" panose="020F0502020204030204" pitchFamily="34" charset="0"/>
+              </a:defRPr>
+            </a:lvl7pPr>
+            <a:lvl8pPr marL="3429000" indent="-228600" eaLnBrk="0" fontAlgn="base" hangingPunct="0">
+              <a:lnSpc>
+                <a:spcPct val="90000"/>
+              </a:lnSpc>
+              <a:spcBef>
+                <a:spcPts val="500"/>
+              </a:spcBef>
+              <a:spcAft>
+                <a:spcPct val="0"/>
+              </a:spcAft>
+              <a:buFont typeface="Arial" panose="020B0604020202020204" pitchFamily="34" charset="0"/>
+              <a:buChar char="•"/>
+              <a:defRPr>
+                <a:solidFill>
+                  <a:schemeClr val="tx1"/>
+                </a:solidFill>
+                <a:latin typeface="Calibri" panose="020F0502020204030204" pitchFamily="34" charset="0"/>
+              </a:defRPr>
+            </a:lvl8pPr>
+            <a:lvl9pPr marL="3886200" indent="-228600" eaLnBrk="0" fontAlgn="base" hangingPunct="0">
+              <a:lnSpc>
+                <a:spcPct val="90000"/>
+              </a:lnSpc>
+              <a:spcBef>
+                <a:spcPts val="500"/>
+              </a:spcBef>
+              <a:spcAft>
+                <a:spcPct val="0"/>
+              </a:spcAft>
+              <a:buFont typeface="Arial" panose="020B0604020202020204" pitchFamily="34" charset="0"/>
+              <a:buChar char="•"/>
+              <a:defRPr>
+                <a:solidFill>
+                  <a:schemeClr val="tx1"/>
+                </a:solidFill>
+                <a:latin typeface="Calibri" panose="020F0502020204030204" pitchFamily="34" charset="0"/>
+              </a:defRPr>
+            </a:lvl9pPr>
+          </a:lstStyle>
+          <a:p>
+            <a:pPr eaLnBrk="1" hangingPunct="1">
+              <a:lnSpc>
+                <a:spcPct val="100000"/>
+              </a:lnSpc>
+              <a:spcBef>
+                <a:spcPct val="0"/>
+              </a:spcBef>
+              <a:buFontTx/>
+              <a:buNone/>
+            </a:pPr>
+            <a:r>
+              <a:rPr lang="en-US" altLang="en-US" sz="4000" dirty="0"/>
+              <a:t>Thank You</a:t>
+            </a:r>
+          </a:p>
+        </p:txBody>
+      </p:sp>
+    </p:spTree>
+    <p:extLst>
+      <p:ext uri="{BB962C8B-B14F-4D97-AF65-F5344CB8AC3E}">
+        <p14:creationId xmlns:p14="http://schemas.microsoft.com/office/powerpoint/2010/main" val="2791261846"/>
+      </p:ext>
+    </p:extLst>
+  </p:cSld>
+  <p:clrMapOvr>
+    <a:masterClrMapping/>
+  </p:clrMapOvr>
+</p:sld>
+</file>
+
+<file path=ppt/slides/slide32.xml><?xml version="1.0" encoding="utf-8"?>
+<p:sld xmlns:a="http://schemas.openxmlformats.org/drawingml/2006/main" xmlns:r="http://schemas.openxmlformats.org/officeDocument/2006/relationships" xmlns:p="http://schemas.openxmlformats.org/presentationml/2006/main">
+  <p:cSld>
+    <p:spTree>
+      <p:nvGrpSpPr>
+        <p:cNvPr id="1" name=""/>
+        <p:cNvGrpSpPr/>
+        <p:nvPr/>
+      </p:nvGrpSpPr>
+      <p:grpSpPr>
+        <a:xfrm>
+          <a:off x="0" y="0"/>
+          <a:ext cx="0" cy="0"/>
+          <a:chOff x="0" y="0"/>
+          <a:chExt cx="0" cy="0"/>
+        </a:xfrm>
+      </p:grpSpPr>
       <p:cxnSp>
         <p:nvCxnSpPr>
           <p:cNvPr id="2" name="Straight Connector 1">
@@ -23043,7 +23925,7 @@
 </p:sld>
 </file>
 
-<file path=ppt/slides/slide31.xml><?xml version="1.0" encoding="utf-8"?>
+<file path=ppt/slides/slide33.xml><?xml version="1.0" encoding="utf-8"?>
 <p:sld xmlns:a="http://schemas.openxmlformats.org/drawingml/2006/main" xmlns:r="http://schemas.openxmlformats.org/officeDocument/2006/relationships" xmlns:p="http://schemas.openxmlformats.org/presentationml/2006/main">
   <p:cSld>
     <p:spTree>

</xml_diff>